<commit_message>
Capturing is now enabled
</commit_message>
<xml_diff>
--- a/dice.pptx
+++ b/dice.pptx
@@ -11,6 +11,7 @@
     <p:sldId id="259" r:id="rId5"/>
     <p:sldId id="260" r:id="rId6"/>
     <p:sldId id="261" r:id="rId7"/>
+    <p:sldId id="262" r:id="rId8"/>
   </p:sldIdLst>
   <p:sldSz cx="5486400" cy="5486400"/>
   <p:notesSz cx="6858000" cy="9144000"/>
@@ -259,7 +260,7 @@
           <a:p>
             <a:fld id="{AF6A3CDB-8F7D-4A07-8D98-004AD41B71E9}" type="datetimeFigureOut">
               <a:rPr lang="en-US" smtClean="0"/>
-              <a:t>12/30/2019</a:t>
+              <a:t>1/1/2020</a:t>
             </a:fld>
             <a:endParaRPr lang="en-US"/>
           </a:p>
@@ -429,7 +430,7 @@
           <a:p>
             <a:fld id="{AF6A3CDB-8F7D-4A07-8D98-004AD41B71E9}" type="datetimeFigureOut">
               <a:rPr lang="en-US" smtClean="0"/>
-              <a:t>12/30/2019</a:t>
+              <a:t>1/1/2020</a:t>
             </a:fld>
             <a:endParaRPr lang="en-US"/>
           </a:p>
@@ -609,7 +610,7 @@
           <a:p>
             <a:fld id="{AF6A3CDB-8F7D-4A07-8D98-004AD41B71E9}" type="datetimeFigureOut">
               <a:rPr lang="en-US" smtClean="0"/>
-              <a:t>12/30/2019</a:t>
+              <a:t>1/1/2020</a:t>
             </a:fld>
             <a:endParaRPr lang="en-US"/>
           </a:p>
@@ -779,7 +780,7 @@
           <a:p>
             <a:fld id="{AF6A3CDB-8F7D-4A07-8D98-004AD41B71E9}" type="datetimeFigureOut">
               <a:rPr lang="en-US" smtClean="0"/>
-              <a:t>12/30/2019</a:t>
+              <a:t>1/1/2020</a:t>
             </a:fld>
             <a:endParaRPr lang="en-US"/>
           </a:p>
@@ -1023,7 +1024,7 @@
           <a:p>
             <a:fld id="{AF6A3CDB-8F7D-4A07-8D98-004AD41B71E9}" type="datetimeFigureOut">
               <a:rPr lang="en-US" smtClean="0"/>
-              <a:t>12/30/2019</a:t>
+              <a:t>1/1/2020</a:t>
             </a:fld>
             <a:endParaRPr lang="en-US"/>
           </a:p>
@@ -1255,7 +1256,7 @@
           <a:p>
             <a:fld id="{AF6A3CDB-8F7D-4A07-8D98-004AD41B71E9}" type="datetimeFigureOut">
               <a:rPr lang="en-US" smtClean="0"/>
-              <a:t>12/30/2019</a:t>
+              <a:t>1/1/2020</a:t>
             </a:fld>
             <a:endParaRPr lang="en-US"/>
           </a:p>
@@ -1622,7 +1623,7 @@
           <a:p>
             <a:fld id="{AF6A3CDB-8F7D-4A07-8D98-004AD41B71E9}" type="datetimeFigureOut">
               <a:rPr lang="en-US" smtClean="0"/>
-              <a:t>12/30/2019</a:t>
+              <a:t>1/1/2020</a:t>
             </a:fld>
             <a:endParaRPr lang="en-US"/>
           </a:p>
@@ -1740,7 +1741,7 @@
           <a:p>
             <a:fld id="{AF6A3CDB-8F7D-4A07-8D98-004AD41B71E9}" type="datetimeFigureOut">
               <a:rPr lang="en-US" smtClean="0"/>
-              <a:t>12/30/2019</a:t>
+              <a:t>1/1/2020</a:t>
             </a:fld>
             <a:endParaRPr lang="en-US"/>
           </a:p>
@@ -1835,7 +1836,7 @@
           <a:p>
             <a:fld id="{AF6A3CDB-8F7D-4A07-8D98-004AD41B71E9}" type="datetimeFigureOut">
               <a:rPr lang="en-US" smtClean="0"/>
-              <a:t>12/30/2019</a:t>
+              <a:t>1/1/2020</a:t>
             </a:fld>
             <a:endParaRPr lang="en-US"/>
           </a:p>
@@ -2112,7 +2113,7 @@
           <a:p>
             <a:fld id="{AF6A3CDB-8F7D-4A07-8D98-004AD41B71E9}" type="datetimeFigureOut">
               <a:rPr lang="en-US" smtClean="0"/>
-              <a:t>12/30/2019</a:t>
+              <a:t>1/1/2020</a:t>
             </a:fld>
             <a:endParaRPr lang="en-US"/>
           </a:p>
@@ -2369,7 +2370,7 @@
           <a:p>
             <a:fld id="{AF6A3CDB-8F7D-4A07-8D98-004AD41B71E9}" type="datetimeFigureOut">
               <a:rPr lang="en-US" smtClean="0"/>
-              <a:t>12/30/2019</a:t>
+              <a:t>1/1/2020</a:t>
             </a:fld>
             <a:endParaRPr lang="en-US"/>
           </a:p>
@@ -2582,7 +2583,7 @@
           <a:p>
             <a:fld id="{AF6A3CDB-8F7D-4A07-8D98-004AD41B71E9}" type="datetimeFigureOut">
               <a:rPr lang="en-US" smtClean="0"/>
-              <a:t>12/30/2019</a:t>
+              <a:t>1/1/2020</a:t>
             </a:fld>
             <a:endParaRPr lang="en-US"/>
           </a:p>
@@ -4680,6 +4681,168 @@
 </p:sld>
 </file>
 
+<file path=ppt/slides/slide7.xml><?xml version="1.0" encoding="utf-8"?>
+<p:sld xmlns:a="http://schemas.openxmlformats.org/drawingml/2006/main" xmlns:r="http://schemas.openxmlformats.org/officeDocument/2006/relationships" xmlns:p="http://schemas.openxmlformats.org/presentationml/2006/main">
+  <p:cSld>
+    <p:spTree>
+      <p:nvGrpSpPr>
+        <p:cNvPr id="1" name=""/>
+        <p:cNvGrpSpPr/>
+        <p:nvPr/>
+      </p:nvGrpSpPr>
+      <p:grpSpPr>
+        <a:xfrm>
+          <a:off x="0" y="0"/>
+          <a:ext cx="0" cy="0"/>
+          <a:chOff x="0" y="0"/>
+          <a:chExt cx="0" cy="0"/>
+        </a:xfrm>
+      </p:grpSpPr>
+      <p:grpSp>
+        <p:nvGrpSpPr>
+          <p:cNvPr id="4" name="Group 3">
+            <a:extLst>
+              <a:ext uri="{FF2B5EF4-FFF2-40B4-BE49-F238E27FC236}">
+                <a16:creationId xmlns:a16="http://schemas.microsoft.com/office/drawing/2014/main" id="{33CDF9D9-7964-40AA-8BD5-32B9C17719E7}"/>
+              </a:ext>
+            </a:extLst>
+          </p:cNvPr>
+          <p:cNvGrpSpPr/>
+          <p:nvPr/>
+        </p:nvGrpSpPr>
+        <p:grpSpPr>
+          <a:xfrm>
+            <a:off x="-1" y="0"/>
+            <a:ext cx="5486401" cy="5486400"/>
+            <a:chOff x="-1" y="0"/>
+            <a:chExt cx="5486401" cy="5486400"/>
+          </a:xfrm>
+        </p:grpSpPr>
+        <p:sp>
+          <p:nvSpPr>
+            <p:cNvPr id="6" name="Rectangle: Rounded Corners 5">
+              <a:extLst>
+                <a:ext uri="{FF2B5EF4-FFF2-40B4-BE49-F238E27FC236}">
+                  <a16:creationId xmlns:a16="http://schemas.microsoft.com/office/drawing/2014/main" id="{443A983C-1BE1-44EA-A1E2-FF5BAB22F7C2}"/>
+                </a:ext>
+              </a:extLst>
+            </p:cNvPr>
+            <p:cNvSpPr/>
+            <p:nvPr/>
+          </p:nvSpPr>
+          <p:spPr>
+            <a:xfrm>
+              <a:off x="0" y="0"/>
+              <a:ext cx="5486400" cy="5486400"/>
+            </a:xfrm>
+            <a:prstGeom prst="roundRect">
+              <a:avLst/>
+            </a:prstGeom>
+            <a:solidFill>
+              <a:srgbClr val="D4AF37"/>
+            </a:solidFill>
+            <a:ln>
+              <a:noFill/>
+            </a:ln>
+          </p:spPr>
+          <p:style>
+            <a:lnRef idx="2">
+              <a:schemeClr val="accent1">
+                <a:shade val="50000"/>
+              </a:schemeClr>
+            </a:lnRef>
+            <a:fillRef idx="1">
+              <a:schemeClr val="accent1"/>
+            </a:fillRef>
+            <a:effectRef idx="0">
+              <a:schemeClr val="accent1"/>
+            </a:effectRef>
+            <a:fontRef idx="minor">
+              <a:schemeClr val="lt1"/>
+            </a:fontRef>
+          </p:style>
+          <p:txBody>
+            <a:bodyPr rtlCol="0" anchor="ctr"/>
+            <a:lstStyle/>
+            <a:p>
+              <a:pPr algn="ctr"/>
+              <a:endParaRPr lang="en-US"/>
+            </a:p>
+          </p:txBody>
+        </p:sp>
+        <p:sp>
+          <p:nvSpPr>
+            <p:cNvPr id="3" name="TextBox 2">
+              <a:extLst>
+                <a:ext uri="{FF2B5EF4-FFF2-40B4-BE49-F238E27FC236}">
+                  <a16:creationId xmlns:a16="http://schemas.microsoft.com/office/drawing/2014/main" id="{007E65C5-5BD6-4380-8FA5-23047E67CEA6}"/>
+                </a:ext>
+              </a:extLst>
+            </p:cNvPr>
+            <p:cNvSpPr txBox="1"/>
+            <p:nvPr/>
+          </p:nvSpPr>
+          <p:spPr>
+            <a:xfrm>
+              <a:off x="-1" y="1940169"/>
+              <a:ext cx="5486399" cy="1508105"/>
+            </a:xfrm>
+            <a:prstGeom prst="rect">
+              <a:avLst/>
+            </a:prstGeom>
+            <a:noFill/>
+          </p:spPr>
+          <p:txBody>
+            <a:bodyPr wrap="square" rtlCol="0">
+              <a:spAutoFit/>
+            </a:bodyPr>
+            <a:lstStyle/>
+            <a:p>
+              <a:pPr algn="ctr"/>
+              <a:r>
+                <a:rPr lang="en-US" sz="4600" dirty="0">
+                  <a:solidFill>
+                    <a:schemeClr val="bg1"/>
+                  </a:solidFill>
+                  <a:latin typeface="Blackadder ITC" panose="04020505051007020D02" pitchFamily="82" charset="0"/>
+                </a:rPr>
+                <a:t>Roll them dice before setting sail </a:t>
+              </a:r>
+              <a:r>
+                <a:rPr lang="en-US" sz="4600" dirty="0" err="1">
+                  <a:solidFill>
+                    <a:schemeClr val="bg1"/>
+                  </a:solidFill>
+                  <a:latin typeface="Blackadder ITC" panose="04020505051007020D02" pitchFamily="82" charset="0"/>
+                </a:rPr>
+                <a:t>matey</a:t>
+              </a:r>
+              <a:r>
+                <a:rPr lang="en-US" sz="4600" dirty="0">
+                  <a:solidFill>
+                    <a:schemeClr val="bg1"/>
+                  </a:solidFill>
+                  <a:latin typeface="Blackadder ITC" panose="04020505051007020D02" pitchFamily="82" charset="0"/>
+                </a:rPr>
+                <a:t>!</a:t>
+              </a:r>
+            </a:p>
+          </p:txBody>
+        </p:sp>
+      </p:grpSp>
+    </p:spTree>
+    <p:extLst>
+      <p:ext uri="{BB962C8B-B14F-4D97-AF65-F5344CB8AC3E}">
+        <p14:creationId xmlns:p14="http://schemas.microsoft.com/office/powerpoint/2010/main" val="3631749042"/>
+      </p:ext>
+    </p:extLst>
+  </p:cSld>
+  <p:clrMapOvr>
+    <a:masterClrMapping/>
+  </p:clrMapOvr>
+</p:sld>
+</file>
+
 <file path=ppt/theme/theme1.xml><?xml version="1.0" encoding="utf-8"?>
 <a:theme xmlns:a="http://schemas.openxmlformats.org/drawingml/2006/main" name="Office Theme">
   <a:themeElements>

</xml_diff>